<commit_message>
dodanie prezentacji do plików apd
</commit_message>
<xml_diff>
--- a/APD/Prezentacja.pptx
+++ b/APD/Prezentacja.pptx
@@ -309,7 +309,7 @@
           <a:p>
             <a:fld id="{04DCBC42-6563-49C0-9AB0-0B46679F5AB4}" type="datetimeFigureOut">
               <a:rPr lang="en-US" smtClean="0"/>
-              <a:t>2/14/2024</a:t>
+              <a:t>2/15/2024</a:t>
             </a:fld>
             <a:endParaRPr lang="en-US"/>
           </a:p>
@@ -11104,8 +11104,8 @@
           </a:prstGeom>
         </p:spPr>
       </p:pic>
-      <mc:AlternateContent xmlns:mc="http://schemas.openxmlformats.org/markup-compatibility/2006">
-        <mc:Choice xmlns:a14="http://schemas.microsoft.com/office/drawing/2010/main" Requires="a14">
+      <mc:AlternateContent xmlns:mc="http://schemas.openxmlformats.org/markup-compatibility/2006" xmlns:a14="http://schemas.microsoft.com/office/drawing/2010/main">
+        <mc:Choice Requires="a14">
           <p:sp>
             <p:nvSpPr>
               <p:cNvPr id="11" name="pole tekstowe 10">
@@ -11134,6 +11134,7 @@
               </a:bodyPr>
               <a:lstStyle/>
               <a:p>
+                <a:pPr/>
                 <a14:m>
                   <m:oMathPara xmlns:m="http://schemas.openxmlformats.org/officeDocument/2006/math">
                     <m:oMathParaPr>
@@ -11837,16 +11838,7 @@
                                 </a:solidFill>
                                 <a:latin typeface="Cambria Math" panose="02040503050406030204" pitchFamily="18" charset="0"/>
                               </a:rPr>
-                              <m:t>𝑤</m:t>
-                            </m:r>
-                            <m:r>
-                              <a:rPr lang="pl-PL" b="0" i="1" smtClean="0">
-                                <a:solidFill>
-                                  <a:schemeClr val="bg1"/>
-                                </a:solidFill>
-                                <a:latin typeface="Cambria Math" panose="02040503050406030204" pitchFamily="18" charset="0"/>
-                              </a:rPr>
-                              <m:t>𝑜</m:t>
+                              <m:t>𝑤𝑜</m:t>
                             </m:r>
                           </m:sub>
                           <m:sup>
@@ -12608,6 +12600,7 @@
                 </a:endParaRPr>
               </a:p>
               <a:p>
+                <a:pPr/>
                 <a14:m>
                   <m:oMathPara xmlns:m="http://schemas.openxmlformats.org/officeDocument/2006/math">
                     <m:oMathParaPr>
@@ -13276,6 +13269,7 @@
                 </a:endParaRPr>
               </a:p>
               <a:p>
+                <a:pPr/>
                 <a14:m>
                   <m:oMathPara xmlns:m="http://schemas.openxmlformats.org/officeDocument/2006/math">
                     <m:oMathParaPr>
@@ -13757,7 +13751,7 @@
             </p:txBody>
           </p:sp>
         </mc:Choice>
-        <mc:Fallback>
+        <mc:Fallback xmlns="">
           <p:sp>
             <p:nvSpPr>
               <p:cNvPr id="11" name="pole tekstowe 10">
@@ -13812,11 +13806,11 @@
   <p:clrMapOvr>
     <a:masterClrMapping/>
   </p:clrMapOvr>
-  <mc:AlternateContent xmlns:mc="http://schemas.openxmlformats.org/markup-compatibility/2006">
-    <mc:Choice xmlns:p14="http://schemas.microsoft.com/office/powerpoint/2010/main" Requires="p14">
+  <mc:AlternateContent xmlns:mc="http://schemas.openxmlformats.org/markup-compatibility/2006" xmlns:p14="http://schemas.microsoft.com/office/powerpoint/2010/main">
+    <mc:Choice Requires="p14">
       <p:transition p14:dur="10"/>
     </mc:Choice>
-    <mc:Fallback>
+    <mc:Fallback xmlns="">
       <p:transition/>
     </mc:Fallback>
   </mc:AlternateContent>
@@ -14073,11 +14067,11 @@
   <p:clrMapOvr>
     <a:masterClrMapping/>
   </p:clrMapOvr>
-  <mc:AlternateContent xmlns:mc="http://schemas.openxmlformats.org/markup-compatibility/2006">
-    <mc:Choice xmlns:p14="http://schemas.microsoft.com/office/powerpoint/2010/main" Requires="p14">
+  <mc:AlternateContent xmlns:mc="http://schemas.openxmlformats.org/markup-compatibility/2006" xmlns:p14="http://schemas.microsoft.com/office/powerpoint/2010/main">
+    <mc:Choice Requires="p14">
       <p:transition p14:dur="10"/>
     </mc:Choice>
-    <mc:Fallback>
+    <mc:Fallback xmlns="">
       <p:transition/>
     </mc:Fallback>
   </mc:AlternateContent>
@@ -14317,11 +14311,11 @@
   <p:clrMapOvr>
     <a:masterClrMapping/>
   </p:clrMapOvr>
-  <mc:AlternateContent xmlns:mc="http://schemas.openxmlformats.org/markup-compatibility/2006">
-    <mc:Choice xmlns:p14="http://schemas.microsoft.com/office/powerpoint/2010/main" Requires="p14">
+  <mc:AlternateContent xmlns:mc="http://schemas.openxmlformats.org/markup-compatibility/2006" xmlns:p14="http://schemas.microsoft.com/office/powerpoint/2010/main">
+    <mc:Choice Requires="p14">
       <p:transition p14:dur="10"/>
     </mc:Choice>
-    <mc:Fallback>
+    <mc:Fallback xmlns="">
       <p:transition/>
     </mc:Fallback>
   </mc:AlternateContent>
@@ -14452,8 +14446,8 @@
           </a:fontRef>
         </p:style>
       </p:cxnSp>
-      <mc:AlternateContent xmlns:mc="http://schemas.openxmlformats.org/markup-compatibility/2006">
-        <mc:Choice xmlns:a14="http://schemas.microsoft.com/office/drawing/2010/main" Requires="a14">
+      <mc:AlternateContent xmlns:mc="http://schemas.openxmlformats.org/markup-compatibility/2006" xmlns:a14="http://schemas.microsoft.com/office/drawing/2010/main">
+        <mc:Choice Requires="a14">
           <p:sp>
             <p:nvSpPr>
               <p:cNvPr id="5" name="TextBox 4">
@@ -14688,7 +14682,7 @@
             </p:txBody>
           </p:sp>
         </mc:Choice>
-        <mc:Fallback>
+        <mc:Fallback xmlns="">
           <p:sp>
             <p:nvSpPr>
               <p:cNvPr id="5" name="TextBox 4">
@@ -14839,8 +14833,8 @@
           </a:p>
         </p:txBody>
       </p:sp>
-      <mc:AlternateContent xmlns:mc="http://schemas.openxmlformats.org/markup-compatibility/2006">
-        <mc:Choice xmlns:a14="http://schemas.microsoft.com/office/drawing/2010/main" Requires="a14">
+      <mc:AlternateContent xmlns:mc="http://schemas.openxmlformats.org/markup-compatibility/2006" xmlns:a14="http://schemas.microsoft.com/office/drawing/2010/main">
+        <mc:Choice Requires="a14">
           <p:sp>
             <p:nvSpPr>
               <p:cNvPr id="12" name="pole tekstowe 11">
@@ -15435,17 +15429,7 @@
                                   <a:latin typeface="Cambria Math" panose="02040503050406030204" pitchFamily="18" charset="0"/>
                                   <a:cs typeface="Poppins" panose="02000000000000000000" pitchFamily="2" charset="0"/>
                                 </a:rPr>
-                                <m:t>)</m:t>
-                              </m:r>
-                              <m:r>
-                                <a:rPr lang="pl-PL" sz="4800" b="0" i="1" smtClean="0">
-                                  <a:solidFill>
-                                    <a:schemeClr val="bg1"/>
-                                  </a:solidFill>
-                                  <a:latin typeface="Cambria Math" panose="02040503050406030204" pitchFamily="18" charset="0"/>
-                                  <a:cs typeface="Poppins" panose="02000000000000000000" pitchFamily="2" charset="0"/>
-                                </a:rPr>
-                                <m:t>|</m:t>
+                                <m:t>)|</m:t>
                               </m:r>
                             </m:num>
                             <m:den>
@@ -15487,7 +15471,7 @@
             </p:txBody>
           </p:sp>
         </mc:Choice>
-        <mc:Fallback>
+        <mc:Fallback xmlns="">
           <p:sp>
             <p:nvSpPr>
               <p:cNvPr id="12" name="pole tekstowe 11">
@@ -15532,8 +15516,8 @@
           </p:sp>
         </mc:Fallback>
       </mc:AlternateContent>
-      <mc:AlternateContent xmlns:mc="http://schemas.openxmlformats.org/markup-compatibility/2006">
-        <mc:Choice xmlns:a14="http://schemas.microsoft.com/office/drawing/2010/main" Requires="a14">
+      <mc:AlternateContent xmlns:mc="http://schemas.openxmlformats.org/markup-compatibility/2006" xmlns:a14="http://schemas.microsoft.com/office/drawing/2010/main">
+        <mc:Choice Requires="a14">
           <p:sp>
             <p:nvSpPr>
               <p:cNvPr id="15" name="TextBox 4">
@@ -15591,11 +15575,11 @@
                     <m:sSub>
                       <m:sSubPr>
                         <m:ctrlPr>
-                          <a:rPr lang="en-US">
+                          <a:rPr lang="en-US" i="1">
                             <a:solidFill>
                               <a:schemeClr val="bg1"/>
                             </a:solidFill>
-                            <a:latin typeface="+mj-lt"/>
+                            <a:latin typeface="Cambria Math" panose="02040503050406030204" pitchFamily="18" charset="0"/>
                             <a:cs typeface="Poppins" panose="02000000000000000000" pitchFamily="2" charset="0"/>
                           </a:rPr>
                         </m:ctrlPr>
@@ -15606,7 +15590,7 @@
                             <a:solidFill>
                               <a:schemeClr val="bg1"/>
                             </a:solidFill>
-                            <a:latin typeface="+mj-lt"/>
+                            <a:latin typeface="Cambria Math" panose="02040503050406030204" pitchFamily="18" charset="0"/>
                             <a:cs typeface="Poppins" panose="02000000000000000000" pitchFamily="2" charset="0"/>
                           </a:rPr>
                           <m:t>𝑇</m:t>
@@ -15618,7 +15602,7 @@
                             <a:solidFill>
                               <a:schemeClr val="bg1"/>
                             </a:solidFill>
-                            <a:latin typeface="+mj-lt"/>
+                            <a:latin typeface="Cambria Math" panose="02040503050406030204" pitchFamily="18" charset="0"/>
                             <a:cs typeface="Poppins" panose="02000000000000000000" pitchFamily="2" charset="0"/>
                           </a:rPr>
                           <m:t>𝑤𝑜</m:t>
@@ -15630,7 +15614,7 @@
                         <a:solidFill>
                           <a:schemeClr val="bg1"/>
                         </a:solidFill>
-                        <a:latin typeface="+mj-lt"/>
+                        <a:latin typeface="Cambria Math" panose="02040503050406030204" pitchFamily="18" charset="0"/>
                         <a:cs typeface="Poppins" panose="02000000000000000000" pitchFamily="2" charset="0"/>
                       </a:rPr>
                       <m:t>(</m:t>
@@ -15640,7 +15624,7 @@
                         <a:solidFill>
                           <a:schemeClr val="bg1"/>
                         </a:solidFill>
-                        <a:latin typeface="+mj-lt"/>
+                        <a:latin typeface="Cambria Math" panose="02040503050406030204" pitchFamily="18" charset="0"/>
                         <a:cs typeface="Poppins" panose="02000000000000000000" pitchFamily="2" charset="0"/>
                       </a:rPr>
                       <m:t>𝑡</m:t>
@@ -15650,7 +15634,7 @@
                         <a:solidFill>
                           <a:schemeClr val="bg1"/>
                         </a:solidFill>
-                        <a:latin typeface="+mj-lt"/>
+                        <a:latin typeface="Cambria Math" panose="02040503050406030204" pitchFamily="18" charset="0"/>
                         <a:cs typeface="Poppins" panose="02000000000000000000" pitchFamily="2" charset="0"/>
                       </a:rPr>
                       <m:t>)</m:t>
@@ -15681,11 +15665,11 @@
                     <m:sSub>
                       <m:sSubPr>
                         <m:ctrlPr>
-                          <a:rPr lang="en-US">
+                          <a:rPr lang="en-US" i="1">
                             <a:solidFill>
                               <a:schemeClr val="bg1"/>
                             </a:solidFill>
-                            <a:latin typeface="+mj-lt"/>
+                            <a:latin typeface="Cambria Math" panose="02040503050406030204" pitchFamily="18" charset="0"/>
                             <a:cs typeface="Poppins" panose="02000000000000000000" pitchFamily="2" charset="0"/>
                           </a:rPr>
                         </m:ctrlPr>
@@ -15696,7 +15680,7 @@
                             <a:solidFill>
                               <a:schemeClr val="bg1"/>
                             </a:solidFill>
-                            <a:latin typeface="+mj-lt"/>
+                            <a:latin typeface="Cambria Math" panose="02040503050406030204" pitchFamily="18" charset="0"/>
                             <a:cs typeface="Poppins" panose="02000000000000000000" pitchFamily="2" charset="0"/>
                           </a:rPr>
                           <m:t>𝑇</m:t>
@@ -15708,7 +15692,7 @@
                             <a:solidFill>
                               <a:schemeClr val="bg1"/>
                             </a:solidFill>
-                            <a:latin typeface="+mj-lt"/>
+                            <a:latin typeface="Cambria Math" panose="02040503050406030204" pitchFamily="18" charset="0"/>
                             <a:cs typeface="Poppins" panose="02000000000000000000" pitchFamily="2" charset="0"/>
                           </a:rPr>
                           <m:t>𝑤𝑦𝑚</m:t>
@@ -15760,7 +15744,7 @@
             </p:txBody>
           </p:sp>
         </mc:Choice>
-        <mc:Fallback>
+        <mc:Fallback xmlns="">
           <p:sp>
             <p:nvSpPr>
               <p:cNvPr id="15" name="TextBox 4">
@@ -15805,8 +15789,8 @@
           </p:sp>
         </mc:Fallback>
       </mc:AlternateContent>
-      <mc:AlternateContent xmlns:mc="http://schemas.openxmlformats.org/markup-compatibility/2006">
-        <mc:Choice xmlns:a14="http://schemas.microsoft.com/office/drawing/2010/main" Requires="a14">
+      <mc:AlternateContent xmlns:mc="http://schemas.openxmlformats.org/markup-compatibility/2006" xmlns:a14="http://schemas.microsoft.com/office/drawing/2010/main">
+        <mc:Choice Requires="a14">
           <p:sp>
             <p:nvSpPr>
               <p:cNvPr id="17" name="pole tekstowe 16">
@@ -15970,7 +15954,7 @@
             </p:txBody>
           </p:sp>
         </mc:Choice>
-        <mc:Fallback>
+        <mc:Fallback xmlns="">
           <p:sp>
             <p:nvSpPr>
               <p:cNvPr id="17" name="pole tekstowe 16">
@@ -16025,11 +16009,11 @@
   <p:clrMapOvr>
     <a:masterClrMapping/>
   </p:clrMapOvr>
-  <mc:AlternateContent xmlns:mc="http://schemas.openxmlformats.org/markup-compatibility/2006">
-    <mc:Choice xmlns:p14="http://schemas.microsoft.com/office/powerpoint/2010/main" Requires="p14">
+  <mc:AlternateContent xmlns:mc="http://schemas.openxmlformats.org/markup-compatibility/2006" xmlns:p14="http://schemas.microsoft.com/office/powerpoint/2010/main">
+    <mc:Choice Requires="p14">
       <p:transition p14:dur="10"/>
     </mc:Choice>
-    <mc:Fallback>
+    <mc:Fallback xmlns="">
       <p:transition/>
     </mc:Fallback>
   </mc:AlternateContent>
@@ -16722,11 +16706,11 @@
   <p:clrMapOvr>
     <a:masterClrMapping/>
   </p:clrMapOvr>
-  <mc:AlternateContent xmlns:mc="http://schemas.openxmlformats.org/markup-compatibility/2006">
-    <mc:Choice xmlns:p14="http://schemas.microsoft.com/office/powerpoint/2010/main" Requires="p14">
+  <mc:AlternateContent xmlns:mc="http://schemas.openxmlformats.org/markup-compatibility/2006" xmlns:p14="http://schemas.microsoft.com/office/powerpoint/2010/main">
+    <mc:Choice Requires="p14">
       <p:transition p14:dur="10"/>
     </mc:Choice>
-    <mc:Fallback>
+    <mc:Fallback xmlns="">
       <p:transition/>
     </mc:Fallback>
   </mc:AlternateContent>
@@ -17036,11 +17020,11 @@
   <p:clrMapOvr>
     <a:masterClrMapping/>
   </p:clrMapOvr>
-  <mc:AlternateContent xmlns:mc="http://schemas.openxmlformats.org/markup-compatibility/2006">
-    <mc:Choice xmlns:p14="http://schemas.microsoft.com/office/powerpoint/2010/main" Requires="p14">
+  <mc:AlternateContent xmlns:mc="http://schemas.openxmlformats.org/markup-compatibility/2006" xmlns:p14="http://schemas.microsoft.com/office/powerpoint/2010/main">
+    <mc:Choice Requires="p14">
       <p:transition p14:dur="10"/>
     </mc:Choice>
-    <mc:Fallback>
+    <mc:Fallback xmlns="">
       <p:transition/>
     </mc:Fallback>
   </mc:AlternateContent>
@@ -17328,11 +17312,11 @@
   <p:clrMapOvr>
     <a:masterClrMapping/>
   </p:clrMapOvr>
-  <mc:AlternateContent xmlns:mc="http://schemas.openxmlformats.org/markup-compatibility/2006">
-    <mc:Choice xmlns:p14="http://schemas.microsoft.com/office/powerpoint/2010/main" Requires="p14">
+  <mc:AlternateContent xmlns:mc="http://schemas.openxmlformats.org/markup-compatibility/2006" xmlns:p14="http://schemas.microsoft.com/office/powerpoint/2010/main">
+    <mc:Choice Requires="p14">
       <p:transition p14:dur="10"/>
     </mc:Choice>
-    <mc:Fallback>
+    <mc:Fallback xmlns="">
       <p:transition/>
     </mc:Fallback>
   </mc:AlternateContent>
@@ -18873,11 +18857,11 @@
   <p:clrMapOvr>
     <a:masterClrMapping/>
   </p:clrMapOvr>
-  <mc:AlternateContent xmlns:mc="http://schemas.openxmlformats.org/markup-compatibility/2006">
-    <mc:Choice xmlns:p14="http://schemas.microsoft.com/office/powerpoint/2010/main" Requires="p14">
+  <mc:AlternateContent xmlns:mc="http://schemas.openxmlformats.org/markup-compatibility/2006" xmlns:p14="http://schemas.microsoft.com/office/powerpoint/2010/main">
+    <mc:Choice Requires="p14">
       <p:transition p14:dur="10"/>
     </mc:Choice>
-    <mc:Fallback>
+    <mc:Fallback xmlns="">
       <p:transition/>
     </mc:Fallback>
   </mc:AlternateContent>
@@ -19265,11 +19249,11 @@
   <p:clrMapOvr>
     <a:masterClrMapping/>
   </p:clrMapOvr>
-  <mc:AlternateContent xmlns:mc="http://schemas.openxmlformats.org/markup-compatibility/2006">
-    <mc:Choice xmlns:p14="http://schemas.microsoft.com/office/powerpoint/2010/main" Requires="p14">
+  <mc:AlternateContent xmlns:mc="http://schemas.openxmlformats.org/markup-compatibility/2006" xmlns:p14="http://schemas.microsoft.com/office/powerpoint/2010/main">
+    <mc:Choice Requires="p14">
       <p:transition p14:dur="10"/>
     </mc:Choice>
-    <mc:Fallback>
+    <mc:Fallback xmlns="">
       <p:transition/>
     </mc:Fallback>
   </mc:AlternateContent>
@@ -19530,7 +19514,7 @@
           <p:nvPr>
             <p:extLst>
               <p:ext uri="{D42A27DB-BD31-4B8C-83A1-F6EECF244321}">
-                <p14:modId xmlns:p14="http://schemas.microsoft.com/office/powerpoint/2010/main" val="217612141"/>
+                <p14:modId xmlns:p14="http://schemas.microsoft.com/office/powerpoint/2010/main" val="1844883877"/>
               </p:ext>
             </p:extLst>
           </p:nvPr>
@@ -19683,7 +19667,7 @@
                       <a:r>
                         <a:rPr lang="pl-PL" sz="3600" b="0" i="0" u="none" strike="noStrike" kern="1200" baseline="0" dirty="0">
                           <a:solidFill>
-                            <a:schemeClr val="dk1"/>
+                            <a:srgbClr val="FF0000"/>
                           </a:solidFill>
                           <a:latin typeface="+mn-lt"/>
                           <a:ea typeface="+mn-ea"/>
@@ -19691,7 +19675,11 @@
                         </a:rPr>
                         <a:t>0.5841</a:t>
                       </a:r>
-                      <a:endParaRPr lang="pl-PL" dirty="0"/>
+                      <a:endParaRPr lang="pl-PL" dirty="0">
+                        <a:solidFill>
+                          <a:srgbClr val="FF0000"/>
+                        </a:solidFill>
+                      </a:endParaRPr>
                     </a:p>
                   </a:txBody>
                   <a:tcPr anchor="ctr"/>
@@ -19749,7 +19737,7 @@
                       <a:r>
                         <a:rPr lang="pl-PL" sz="3600" b="0" i="0" u="none" strike="noStrike" kern="1200" baseline="0" dirty="0">
                           <a:solidFill>
-                            <a:schemeClr val="dk1"/>
+                            <a:srgbClr val="FF0000"/>
                           </a:solidFill>
                           <a:latin typeface="+mn-lt"/>
                           <a:ea typeface="+mn-ea"/>
@@ -19757,7 +19745,11 @@
                         </a:rPr>
                         <a:t>0.5842</a:t>
                       </a:r>
-                      <a:endParaRPr lang="pl-PL" dirty="0"/>
+                      <a:endParaRPr lang="pl-PL" dirty="0">
+                        <a:solidFill>
+                          <a:srgbClr val="FF0000"/>
+                        </a:solidFill>
+                      </a:endParaRPr>
                     </a:p>
                   </a:txBody>
                   <a:tcPr anchor="ctr"/>
@@ -19858,7 +19850,7 @@
                       <a:r>
                         <a:rPr lang="pl-PL" sz="3600" b="0" i="0" u="none" strike="noStrike" kern="1200" baseline="0" dirty="0">
                           <a:solidFill>
-                            <a:schemeClr val="dk1"/>
+                            <a:srgbClr val="FF0000"/>
                           </a:solidFill>
                           <a:latin typeface="+mn-lt"/>
                           <a:ea typeface="+mn-ea"/>
@@ -19866,7 +19858,11 @@
                         </a:rPr>
                         <a:t>0.5572</a:t>
                       </a:r>
-                      <a:endParaRPr lang="pl-PL" dirty="0"/>
+                      <a:endParaRPr lang="pl-PL" dirty="0">
+                        <a:solidFill>
+                          <a:srgbClr val="FF0000"/>
+                        </a:solidFill>
+                      </a:endParaRPr>
                     </a:p>
                   </a:txBody>
                   <a:tcPr anchor="ctr"/>
@@ -19967,7 +19963,7 @@
                       <a:r>
                         <a:rPr lang="pl-PL" sz="3600" b="0" i="0" u="none" strike="noStrike" kern="1200" baseline="0" dirty="0">
                           <a:solidFill>
-                            <a:schemeClr val="dk1"/>
+                            <a:srgbClr val="FF0000"/>
                           </a:solidFill>
                           <a:latin typeface="+mn-lt"/>
                           <a:ea typeface="+mn-ea"/>
@@ -19975,7 +19971,11 @@
                         </a:rPr>
                         <a:t>0.7271</a:t>
                       </a:r>
-                      <a:endParaRPr lang="pl-PL" dirty="0"/>
+                      <a:endParaRPr lang="pl-PL" dirty="0">
+                        <a:solidFill>
+                          <a:srgbClr val="FF0000"/>
+                        </a:solidFill>
+                      </a:endParaRPr>
                     </a:p>
                   </a:txBody>
                   <a:tcPr anchor="ctr"/>
@@ -20000,11 +20000,11 @@
   <p:clrMapOvr>
     <a:masterClrMapping/>
   </p:clrMapOvr>
-  <mc:AlternateContent xmlns:mc="http://schemas.openxmlformats.org/markup-compatibility/2006">
-    <mc:Choice xmlns:p14="http://schemas.microsoft.com/office/powerpoint/2010/main" Requires="p14">
+  <mc:AlternateContent xmlns:mc="http://schemas.openxmlformats.org/markup-compatibility/2006" xmlns:p14="http://schemas.microsoft.com/office/powerpoint/2010/main">
+    <mc:Choice Requires="p14">
       <p:transition p14:dur="10"/>
     </mc:Choice>
-    <mc:Fallback>
+    <mc:Fallback xmlns="">
       <p:transition/>
     </mc:Fallback>
   </mc:AlternateContent>
@@ -20176,11 +20176,11 @@
   <p:clrMapOvr>
     <a:masterClrMapping/>
   </p:clrMapOvr>
-  <mc:AlternateContent xmlns:mc="http://schemas.openxmlformats.org/markup-compatibility/2006">
-    <mc:Choice xmlns:p14="http://schemas.microsoft.com/office/powerpoint/2010/main" Requires="p14">
+  <mc:AlternateContent xmlns:mc="http://schemas.openxmlformats.org/markup-compatibility/2006" xmlns:p14="http://schemas.microsoft.com/office/powerpoint/2010/main">
+    <mc:Choice Requires="p14">
       <p:transition p14:dur="10"/>
     </mc:Choice>
-    <mc:Fallback>
+    <mc:Fallback xmlns="">
       <p:transition/>
     </mc:Fallback>
   </mc:AlternateContent>
@@ -21383,11 +21383,11 @@
   <p:clrMapOvr>
     <a:masterClrMapping/>
   </p:clrMapOvr>
-  <mc:AlternateContent xmlns:mc="http://schemas.openxmlformats.org/markup-compatibility/2006">
-    <mc:Choice xmlns:p14="http://schemas.microsoft.com/office/powerpoint/2010/main" Requires="p14">
+  <mc:AlternateContent xmlns:mc="http://schemas.openxmlformats.org/markup-compatibility/2006" xmlns:p14="http://schemas.microsoft.com/office/powerpoint/2010/main">
+    <mc:Choice Requires="p14">
       <p:transition p14:dur="10"/>
     </mc:Choice>
-    <mc:Fallback>
+    <mc:Fallback xmlns="">
       <p:transition/>
     </mc:Fallback>
   </mc:AlternateContent>
@@ -22689,11 +22689,11 @@
   <p:clrMapOvr>
     <a:masterClrMapping/>
   </p:clrMapOvr>
-  <mc:AlternateContent xmlns:mc="http://schemas.openxmlformats.org/markup-compatibility/2006">
-    <mc:Choice xmlns:p14="http://schemas.microsoft.com/office/powerpoint/2010/main" Requires="p14">
+  <mc:AlternateContent xmlns:mc="http://schemas.openxmlformats.org/markup-compatibility/2006" xmlns:p14="http://schemas.microsoft.com/office/powerpoint/2010/main">
+    <mc:Choice Requires="p14">
       <p:transition p14:dur="10"/>
     </mc:Choice>
-    <mc:Fallback>
+    <mc:Fallback xmlns="">
       <p:transition/>
     </mc:Fallback>
   </mc:AlternateContent>

</xml_diff>